<commit_message>
Correlation and Presentation Updated
Correlation Added to Plot for Independent Plots. Presentation Updated to
be the required 2 slides with all the necessary pictures added.
</commit_message>
<xml_diff>
--- a/Project Presentation-The Aftermath.pptx
+++ b/Project Presentation-The Aftermath.pptx
@@ -7,8 +7,6 @@
   <p:sldIdLst>
     <p:sldId id="256" r:id="rId2"/>
     <p:sldId id="257" r:id="rId3"/>
-    <p:sldId id="258" r:id="rId4"/>
-    <p:sldId id="259" r:id="rId5"/>
   </p:sldIdLst>
   <p:sldSz cx="12192000" cy="6858000"/>
   <p:notesSz cx="6858000" cy="9144000"/>
@@ -115,6 +113,10 @@
 </p:presentation>
 </file>
 
+<file path=ppt/revisionInfo.xml><?xml version="1.0" encoding="utf-8"?>
+<p1510:revInfo xmlns:a="http://schemas.openxmlformats.org/drawingml/2006/main" xmlns:r="http://schemas.openxmlformats.org/officeDocument/2006/relationships" xmlns:p1510="http://schemas.microsoft.com/office/powerpoint/2015/10/main"/>
+</file>
+
 <file path=ppt/slideLayouts/slideLayout1.xml><?xml version="1.0" encoding="utf-8"?>
 <p:sldLayout xmlns:a="http://schemas.openxmlformats.org/drawingml/2006/main" xmlns:r="http://schemas.openxmlformats.org/officeDocument/2006/relationships" xmlns:p="http://schemas.openxmlformats.org/presentationml/2006/main" showMasterSp="0" type="title" preserve="1">
   <p:cSld name="Title Slide">
@@ -307,7 +309,7 @@
             <a:fld id="{B61BEF0D-F0BB-DE4B-95CE-6DB70DBA9567}" type="datetimeFigureOut">
               <a:rPr lang="en-US" dirty="0"/>
               <a:pPr/>
-              <a:t>5/10/2017</a:t>
+              <a:t>5/15/2017</a:t>
             </a:fld>
             <a:endParaRPr lang="en-US" dirty="0"/>
           </a:p>
@@ -740,7 +742,7 @@
             <a:fld id="{B61BEF0D-F0BB-DE4B-95CE-6DB70DBA9567}" type="datetimeFigureOut">
               <a:rPr lang="en-US" dirty="0"/>
               <a:pPr/>
-              <a:t>5/10/2017</a:t>
+              <a:t>5/15/2017</a:t>
             </a:fld>
             <a:endParaRPr lang="en-US" dirty="0"/>
           </a:p>
@@ -987,7 +989,7 @@
             <a:fld id="{B61BEF0D-F0BB-DE4B-95CE-6DB70DBA9567}" type="datetimeFigureOut">
               <a:rPr lang="en-US" dirty="0"/>
               <a:pPr/>
-              <a:t>5/10/2017</a:t>
+              <a:t>5/15/2017</a:t>
             </a:fld>
             <a:endParaRPr lang="en-US" dirty="0"/>
           </a:p>
@@ -1292,7 +1294,7 @@
             <a:fld id="{B61BEF0D-F0BB-DE4B-95CE-6DB70DBA9567}" type="datetimeFigureOut">
               <a:rPr lang="en-US" dirty="0"/>
               <a:pPr/>
-              <a:t>5/10/2017</a:t>
+              <a:t>5/15/2017</a:t>
             </a:fld>
             <a:endParaRPr lang="en-US" dirty="0"/>
           </a:p>
@@ -1607,7 +1609,7 @@
             <a:fld id="{B61BEF0D-F0BB-DE4B-95CE-6DB70DBA9567}" type="datetimeFigureOut">
               <a:rPr lang="en-US" dirty="0"/>
               <a:pPr/>
-              <a:t>5/10/2017</a:t>
+              <a:t>5/15/2017</a:t>
             </a:fld>
             <a:endParaRPr lang="en-US" dirty="0"/>
           </a:p>
@@ -1906,7 +1908,7 @@
             <a:fld id="{B61BEF0D-F0BB-DE4B-95CE-6DB70DBA9567}" type="datetimeFigureOut">
               <a:rPr lang="en-US" dirty="0"/>
               <a:pPr/>
-              <a:t>5/10/2017</a:t>
+              <a:t>5/15/2017</a:t>
             </a:fld>
             <a:endParaRPr lang="en-US" dirty="0"/>
           </a:p>
@@ -2270,7 +2272,7 @@
             <a:fld id="{B61BEF0D-F0BB-DE4B-95CE-6DB70DBA9567}" type="datetimeFigureOut">
               <a:rPr lang="en-US" dirty="0"/>
               <a:pPr/>
-              <a:t>5/10/2017</a:t>
+              <a:t>5/15/2017</a:t>
             </a:fld>
             <a:endParaRPr lang="en-US" dirty="0"/>
           </a:p>
@@ -2441,7 +2443,7 @@
             <a:fld id="{B61BEF0D-F0BB-DE4B-95CE-6DB70DBA9567}" type="datetimeFigureOut">
               <a:rPr lang="en-US" dirty="0"/>
               <a:pPr/>
-              <a:t>5/10/2017</a:t>
+              <a:t>5/15/2017</a:t>
             </a:fld>
             <a:endParaRPr lang="en-US" dirty="0"/>
           </a:p>
@@ -2618,7 +2620,7 @@
             <a:fld id="{B61BEF0D-F0BB-DE4B-95CE-6DB70DBA9567}" type="datetimeFigureOut">
               <a:rPr lang="en-US" dirty="0"/>
               <a:pPr/>
-              <a:t>5/10/2017</a:t>
+              <a:t>5/15/2017</a:t>
             </a:fld>
             <a:endParaRPr lang="en-US" dirty="0"/>
           </a:p>
@@ -2785,7 +2787,7 @@
             <a:fld id="{B61BEF0D-F0BB-DE4B-95CE-6DB70DBA9567}" type="datetimeFigureOut">
               <a:rPr lang="en-US" dirty="0"/>
               <a:pPr/>
-              <a:t>5/10/2017</a:t>
+              <a:t>5/15/2017</a:t>
             </a:fld>
             <a:endParaRPr lang="en-US" dirty="0"/>
           </a:p>
@@ -3032,7 +3034,7 @@
             <a:fld id="{B61BEF0D-F0BB-DE4B-95CE-6DB70DBA9567}" type="datetimeFigureOut">
               <a:rPr lang="en-US" dirty="0"/>
               <a:pPr/>
-              <a:t>5/10/2017</a:t>
+              <a:t>5/15/2017</a:t>
             </a:fld>
             <a:endParaRPr lang="en-US" dirty="0"/>
           </a:p>
@@ -3265,7 +3267,7 @@
             <a:fld id="{B61BEF0D-F0BB-DE4B-95CE-6DB70DBA9567}" type="datetimeFigureOut">
               <a:rPr lang="en-US" dirty="0"/>
               <a:pPr/>
-              <a:t>5/10/2017</a:t>
+              <a:t>5/15/2017</a:t>
             </a:fld>
             <a:endParaRPr lang="en-US" dirty="0"/>
           </a:p>
@@ -3644,7 +3646,7 @@
             <a:fld id="{B61BEF0D-F0BB-DE4B-95CE-6DB70DBA9567}" type="datetimeFigureOut">
               <a:rPr lang="en-US" dirty="0"/>
               <a:pPr/>
-              <a:t>5/10/2017</a:t>
+              <a:t>5/15/2017</a:t>
             </a:fld>
             <a:endParaRPr lang="en-US" dirty="0"/>
           </a:p>
@@ -3759,7 +3761,7 @@
             <a:fld id="{B61BEF0D-F0BB-DE4B-95CE-6DB70DBA9567}" type="datetimeFigureOut">
               <a:rPr lang="en-US" dirty="0"/>
               <a:pPr/>
-              <a:t>5/10/2017</a:t>
+              <a:t>5/15/2017</a:t>
             </a:fld>
             <a:endParaRPr lang="en-US" dirty="0"/>
           </a:p>
@@ -3851,7 +3853,7 @@
             <a:fld id="{B61BEF0D-F0BB-DE4B-95CE-6DB70DBA9567}" type="datetimeFigureOut">
               <a:rPr lang="en-US" dirty="0"/>
               <a:pPr/>
-              <a:t>5/10/2017</a:t>
+              <a:t>5/15/2017</a:t>
             </a:fld>
             <a:endParaRPr lang="en-US" dirty="0"/>
           </a:p>
@@ -4103,7 +4105,7 @@
             <a:fld id="{B61BEF0D-F0BB-DE4B-95CE-6DB70DBA9567}" type="datetimeFigureOut">
               <a:rPr lang="en-US" dirty="0"/>
               <a:pPr/>
-              <a:t>5/10/2017</a:t>
+              <a:t>5/15/2017</a:t>
             </a:fld>
             <a:endParaRPr lang="en-US" dirty="0"/>
           </a:p>
@@ -4383,7 +4385,7 @@
             <a:fld id="{B61BEF0D-F0BB-DE4B-95CE-6DB70DBA9567}" type="datetimeFigureOut">
               <a:rPr lang="en-US" dirty="0"/>
               <a:pPr/>
-              <a:t>5/10/2017</a:t>
+              <a:t>5/15/2017</a:t>
             </a:fld>
             <a:endParaRPr lang="en-US" dirty="0"/>
           </a:p>
@@ -4786,7 +4788,7 @@
             <a:fld id="{B61BEF0D-F0BB-DE4B-95CE-6DB70DBA9567}" type="datetimeFigureOut">
               <a:rPr lang="en-US" dirty="0"/>
               <a:pPr/>
-              <a:t>5/10/2017</a:t>
+              <a:t>5/15/2017</a:t>
             </a:fld>
             <a:endParaRPr lang="en-US" dirty="0"/>
           </a:p>
@@ -5327,15 +5329,20 @@
             <p:ph type="ctrTitle"/>
           </p:nvPr>
         </p:nvSpPr>
-        <p:spPr/>
+        <p:spPr>
+          <a:xfrm>
+            <a:off x="138522" y="0"/>
+            <a:ext cx="8001000" cy="1076632"/>
+          </a:xfrm>
+        </p:spPr>
         <p:txBody>
           <a:bodyPr>
-            <a:normAutofit/>
+            <a:noAutofit/>
           </a:bodyPr>
           <a:lstStyle/>
           <a:p>
             <a:r>
-              <a:rPr lang="en-US" sz="8000" dirty="0"/>
+              <a:rPr lang="en-US" sz="6600" dirty="0"/>
               <a:t>The Aftermath</a:t>
             </a:r>
           </a:p>
@@ -5351,7 +5358,12 @@
             <p:ph type="subTitle" idx="1"/>
           </p:nvPr>
         </p:nvSpPr>
-        <p:spPr/>
+        <p:spPr>
+          <a:xfrm>
+            <a:off x="5639670" y="1076632"/>
+            <a:ext cx="6400800" cy="624894"/>
+          </a:xfrm>
+        </p:spPr>
         <p:txBody>
           <a:bodyPr/>
           <a:lstStyle/>
@@ -5359,6 +5371,164 @@
             <a:r>
               <a:rPr lang="en-US" sz="3200" dirty="0"/>
               <a:t>Social Impact of a TV Show</a:t>
+            </a:r>
+          </a:p>
+        </p:txBody>
+      </p:sp>
+      <p:sp>
+        <p:nvSpPr>
+          <p:cNvPr id="4" name="Rectangle 3"/>
+          <p:cNvSpPr/>
+          <p:nvPr/>
+        </p:nvSpPr>
+        <p:spPr>
+          <a:xfrm>
+            <a:off x="364560" y="2153264"/>
+            <a:ext cx="11547692" cy="1384995"/>
+          </a:xfrm>
+          <a:prstGeom prst="rect">
+            <a:avLst/>
+          </a:prstGeom>
+        </p:spPr>
+        <p:txBody>
+          <a:bodyPr wrap="square">
+            <a:spAutoFit/>
+          </a:bodyPr>
+          <a:lstStyle/>
+          <a:p>
+            <a:r>
+              <a:rPr lang="en-US" sz="2800" dirty="0"/>
+              <a:t>Question: </a:t>
+            </a:r>
+            <a:r>
+              <a:rPr lang="en-US" sz="2800" dirty="0">
+                <a:solidFill>
+                  <a:srgbClr val="FF0000"/>
+                </a:solidFill>
+              </a:rPr>
+              <a:t>Does the Popularity of A TV Show Affect </a:t>
+            </a:r>
+          </a:p>
+          <a:p>
+            <a:r>
+              <a:rPr lang="en-US" sz="2800" dirty="0">
+                <a:solidFill>
+                  <a:srgbClr val="FF0000"/>
+                </a:solidFill>
+              </a:rPr>
+              <a:t>the Number of Newborns each year named similarly to</a:t>
+            </a:r>
+          </a:p>
+          <a:p>
+            <a:r>
+              <a:rPr lang="en-US" sz="2800" dirty="0">
+                <a:solidFill>
+                  <a:srgbClr val="FF0000"/>
+                </a:solidFill>
+              </a:rPr>
+              <a:t>The characters from The Show?</a:t>
+            </a:r>
+          </a:p>
+        </p:txBody>
+      </p:sp>
+      <p:sp>
+        <p:nvSpPr>
+          <p:cNvPr id="5" name="Rectangle 4"/>
+          <p:cNvSpPr/>
+          <p:nvPr/>
+        </p:nvSpPr>
+        <p:spPr>
+          <a:xfrm>
+            <a:off x="364560" y="3620665"/>
+            <a:ext cx="1199367" cy="523220"/>
+          </a:xfrm>
+          <a:prstGeom prst="rect">
+            <a:avLst/>
+          </a:prstGeom>
+        </p:spPr>
+        <p:txBody>
+          <a:bodyPr wrap="none">
+            <a:spAutoFit/>
+          </a:bodyPr>
+          <a:lstStyle/>
+          <a:p>
+            <a:r>
+              <a:rPr lang="en-US" sz="2800" dirty="0"/>
+              <a:t>WHY?</a:t>
+            </a:r>
+          </a:p>
+        </p:txBody>
+      </p:sp>
+      <p:sp>
+        <p:nvSpPr>
+          <p:cNvPr id="6" name="Rectangle 5"/>
+          <p:cNvSpPr/>
+          <p:nvPr/>
+        </p:nvSpPr>
+        <p:spPr>
+          <a:xfrm>
+            <a:off x="964242" y="4112226"/>
+            <a:ext cx="10948009" cy="2308324"/>
+          </a:xfrm>
+          <a:prstGeom prst="rect">
+            <a:avLst/>
+          </a:prstGeom>
+        </p:spPr>
+        <p:txBody>
+          <a:bodyPr wrap="square">
+            <a:spAutoFit/>
+          </a:bodyPr>
+          <a:lstStyle/>
+          <a:p>
+            <a:r>
+              <a:rPr lang="en-US" sz="2400" dirty="0">
+                <a:solidFill>
+                  <a:schemeClr val="accent4">
+                    <a:lumMod val="40000"/>
+                    <a:lumOff val="60000"/>
+                  </a:schemeClr>
+                </a:solidFill>
+              </a:rPr>
+              <a:t>- It can indicate social progress</a:t>
+            </a:r>
+          </a:p>
+          <a:p>
+            <a:r>
+              <a:rPr lang="en-US" sz="2400" dirty="0">
+                <a:solidFill>
+                  <a:schemeClr val="accent4">
+                    <a:lumMod val="40000"/>
+                    <a:lumOff val="60000"/>
+                  </a:schemeClr>
+                </a:solidFill>
+              </a:rPr>
+              <a:t>- It is Indicative of greater or lesser social acceptance certain groups/ideologies</a:t>
+            </a:r>
+          </a:p>
+          <a:p>
+            <a:r>
+              <a:rPr lang="en-US" sz="2400" dirty="0">
+                <a:solidFill>
+                  <a:schemeClr val="accent4">
+                    <a:lumMod val="40000"/>
+                    <a:lumOff val="60000"/>
+                  </a:schemeClr>
+                </a:solidFill>
+              </a:rPr>
+              <a:t>    - Same for certain behaviors exhibited by the characters in the show</a:t>
+            </a:r>
+          </a:p>
+          <a:p>
+            <a:r>
+              <a:rPr lang="en-US" sz="2400" dirty="0">
+                <a:solidFill>
+                  <a:schemeClr val="accent4">
+                    <a:lumMod val="40000"/>
+                    <a:lumOff val="60000"/>
+                  </a:schemeClr>
+                </a:solidFill>
+              </a:rPr>
+              <a:t>- It may also show greater or lesser appreciation of certain qualities, actions or agendas shown or persuaded by the characters </a:t>
             </a:r>
           </a:p>
         </p:txBody>
@@ -5405,8 +5575,8 @@
         </p:nvSpPr>
         <p:spPr>
           <a:xfrm>
-            <a:off x="684212" y="4487332"/>
-            <a:ext cx="8534400" cy="1888068"/>
+            <a:off x="3564610" y="0"/>
+            <a:ext cx="1245385" cy="926926"/>
           </a:xfrm>
         </p:spPr>
         <p:txBody>
@@ -5416,51 +5586,50 @@
           <a:lstStyle/>
           <a:p>
             <a:r>
-              <a:rPr lang="en-US" sz="2000" dirty="0"/>
-              <a:t>Correlation between The Big Bang Theory viewership and </a:t>
+              <a:rPr lang="en-US" sz="1200" dirty="0"/>
+              <a:t> </a:t>
             </a:r>
             <a:br>
-              <a:rPr lang="en-US" sz="2000" dirty="0"/>
+              <a:rPr lang="en-US" sz="1200" dirty="0"/>
             </a:br>
-            <a:r>
-              <a:rPr lang="en-US" sz="2000" dirty="0"/>
-              <a:t>children named Penny : 0.864</a:t>
-            </a:r>
             <a:br>
-              <a:rPr lang="en-US" sz="2000" dirty="0"/>
+              <a:rPr lang="en-US" sz="1200" dirty="0"/>
             </a:br>
-            <a:r>
-              <a:rPr lang="en-US" sz="2000" dirty="0"/>
-              <a:t>children named Sheldon : -0.692</a:t>
-            </a:r>
+            <a:endParaRPr lang="en-US" sz="1200" dirty="0"/>
+          </a:p>
+        </p:txBody>
+      </p:sp>
+      <p:sp>
+        <p:nvSpPr>
+          <p:cNvPr id="18" name="Rectangle 17"/>
+          <p:cNvSpPr/>
+          <p:nvPr/>
+        </p:nvSpPr>
+        <p:spPr>
+          <a:xfrm>
+            <a:off x="3564610" y="1252262"/>
+            <a:ext cx="1019916" cy="646331"/>
+          </a:xfrm>
+          <a:prstGeom prst="rect">
+            <a:avLst/>
+          </a:prstGeom>
+        </p:spPr>
+        <p:txBody>
+          <a:bodyPr wrap="square">
+            <a:spAutoFit/>
+          </a:bodyPr>
+          <a:lstStyle/>
+          <a:p>
             <a:br>
-              <a:rPr lang="en-US" sz="2000" dirty="0"/>
+              <a:rPr lang="en-US" dirty="0"/>
             </a:br>
-            <a:r>
-              <a:rPr lang="en-US" sz="2000" dirty="0"/>
-              <a:t>children named Leonard : 0.860</a:t>
-            </a:r>
-            <a:br>
-              <a:rPr lang="en-US" sz="2000" dirty="0"/>
-            </a:br>
-            <a:r>
-              <a:rPr lang="en-US" sz="2000" dirty="0"/>
-              <a:t>children named Raj : -0.073</a:t>
-            </a:r>
-            <a:br>
-              <a:rPr lang="en-US" sz="2000" dirty="0"/>
-            </a:br>
-            <a:r>
-              <a:rPr lang="en-US" sz="2000" dirty="0"/>
-              <a:t>children named Howard : -0.596</a:t>
-            </a:r>
-            <a:endParaRPr lang="en-US" sz="2000" dirty="0"/>
+            <a:endParaRPr lang="en-US" dirty="0"/>
           </a:p>
         </p:txBody>
       </p:sp>
       <p:pic>
         <p:nvPicPr>
-          <p:cNvPr id="4" name="Content Placeholder 3"/>
+          <p:cNvPr id="5" name="Content Placeholder 4"/>
           <p:cNvPicPr>
             <a:picLocks noGrp="1" noChangeAspect="1"/>
           </p:cNvPicPr>
@@ -5476,8 +5645,461 @@
         </p:blipFill>
         <p:spPr>
           <a:xfrm>
-            <a:off x="2838642" y="101601"/>
-            <a:ext cx="7204363" cy="4165600"/>
+            <a:off x="1" y="0"/>
+            <a:ext cx="1896409" cy="1674890"/>
+          </a:xfrm>
+        </p:spPr>
+      </p:pic>
+      <p:pic>
+        <p:nvPicPr>
+          <p:cNvPr id="6" name="Picture 5"/>
+          <p:cNvPicPr>
+            <a:picLocks noChangeAspect="1"/>
+          </p:cNvPicPr>
+          <p:nvPr/>
+        </p:nvPicPr>
+        <p:blipFill>
+          <a:blip r:embed="rId3"/>
+          <a:stretch>
+            <a:fillRect/>
+          </a:stretch>
+        </p:blipFill>
+        <p:spPr>
+          <a:xfrm>
+            <a:off x="1742720" y="0"/>
+            <a:ext cx="2186529" cy="1674891"/>
+          </a:xfrm>
+          <a:prstGeom prst="rect">
+            <a:avLst/>
+          </a:prstGeom>
+        </p:spPr>
+      </p:pic>
+      <p:pic>
+        <p:nvPicPr>
+          <p:cNvPr id="8" name="Picture 7"/>
+          <p:cNvPicPr>
+            <a:picLocks noChangeAspect="1"/>
+          </p:cNvPicPr>
+          <p:nvPr/>
+        </p:nvPicPr>
+        <p:blipFill>
+          <a:blip r:embed="rId4"/>
+          <a:stretch>
+            <a:fillRect/>
+          </a:stretch>
+        </p:blipFill>
+        <p:spPr>
+          <a:xfrm>
+            <a:off x="3718300" y="0"/>
+            <a:ext cx="2252796" cy="1674890"/>
+          </a:xfrm>
+          <a:prstGeom prst="rect">
+            <a:avLst/>
+          </a:prstGeom>
+        </p:spPr>
+      </p:pic>
+      <p:pic>
+        <p:nvPicPr>
+          <p:cNvPr id="10" name="Picture 9"/>
+          <p:cNvPicPr>
+            <a:picLocks noChangeAspect="1"/>
+          </p:cNvPicPr>
+          <p:nvPr/>
+        </p:nvPicPr>
+        <p:blipFill>
+          <a:blip r:embed="rId5"/>
+          <a:stretch>
+            <a:fillRect/>
+          </a:stretch>
+        </p:blipFill>
+        <p:spPr>
+          <a:xfrm>
+            <a:off x="5783343" y="-2845"/>
+            <a:ext cx="2229600" cy="1674891"/>
+          </a:xfrm>
+          <a:prstGeom prst="rect">
+            <a:avLst/>
+          </a:prstGeom>
+        </p:spPr>
+      </p:pic>
+      <p:pic>
+        <p:nvPicPr>
+          <p:cNvPr id="12" name="Picture 11"/>
+          <p:cNvPicPr>
+            <a:picLocks noChangeAspect="1"/>
+          </p:cNvPicPr>
+          <p:nvPr/>
+        </p:nvPicPr>
+        <p:blipFill>
+          <a:blip r:embed="rId6"/>
+          <a:stretch>
+            <a:fillRect/>
+          </a:stretch>
+        </p:blipFill>
+        <p:spPr>
+          <a:xfrm>
+            <a:off x="7849531" y="-5689"/>
+            <a:ext cx="2223275" cy="1674890"/>
+          </a:xfrm>
+          <a:prstGeom prst="rect">
+            <a:avLst/>
+          </a:prstGeom>
+        </p:spPr>
+      </p:pic>
+      <p:pic>
+        <p:nvPicPr>
+          <p:cNvPr id="14" name="Picture 13"/>
+          <p:cNvPicPr>
+            <a:picLocks noChangeAspect="1"/>
+          </p:cNvPicPr>
+          <p:nvPr/>
+        </p:nvPicPr>
+        <p:blipFill>
+          <a:blip r:embed="rId7"/>
+          <a:stretch>
+            <a:fillRect/>
+          </a:stretch>
+        </p:blipFill>
+        <p:spPr>
+          <a:xfrm>
+            <a:off x="9902168" y="-8534"/>
+            <a:ext cx="2300622" cy="1676313"/>
+          </a:xfrm>
+          <a:prstGeom prst="rect">
+            <a:avLst/>
+          </a:prstGeom>
+        </p:spPr>
+      </p:pic>
+      <p:pic>
+        <p:nvPicPr>
+          <p:cNvPr id="16" name="Picture 15"/>
+          <p:cNvPicPr>
+            <a:picLocks noChangeAspect="1"/>
+          </p:cNvPicPr>
+          <p:nvPr/>
+        </p:nvPicPr>
+        <p:blipFill>
+          <a:blip r:embed="rId8"/>
+          <a:stretch>
+            <a:fillRect/>
+          </a:stretch>
+        </p:blipFill>
+        <p:spPr>
+          <a:xfrm>
+            <a:off x="-10789" y="1785587"/>
+            <a:ext cx="1896410" cy="1673352"/>
+          </a:xfrm>
+          <a:prstGeom prst="rect">
+            <a:avLst/>
+          </a:prstGeom>
+        </p:spPr>
+      </p:pic>
+      <p:pic>
+        <p:nvPicPr>
+          <p:cNvPr id="20" name="Picture 19"/>
+          <p:cNvPicPr>
+            <a:picLocks noChangeAspect="1"/>
+          </p:cNvPicPr>
+          <p:nvPr/>
+        </p:nvPicPr>
+        <p:blipFill>
+          <a:blip r:embed="rId9"/>
+          <a:stretch>
+            <a:fillRect/>
+          </a:stretch>
+        </p:blipFill>
+        <p:spPr>
+          <a:xfrm>
+            <a:off x="1731930" y="1785585"/>
+            <a:ext cx="2185416" cy="1673353"/>
+          </a:xfrm>
+          <a:prstGeom prst="rect">
+            <a:avLst/>
+          </a:prstGeom>
+        </p:spPr>
+      </p:pic>
+      <p:pic>
+        <p:nvPicPr>
+          <p:cNvPr id="21" name="Picture 20"/>
+          <p:cNvPicPr>
+            <a:picLocks noChangeAspect="1"/>
+          </p:cNvPicPr>
+          <p:nvPr/>
+        </p:nvPicPr>
+        <p:blipFill>
+          <a:blip r:embed="rId10"/>
+          <a:stretch>
+            <a:fillRect/>
+          </a:stretch>
+        </p:blipFill>
+        <p:spPr>
+          <a:xfrm>
+            <a:off x="3780107" y="1785585"/>
+            <a:ext cx="2180199" cy="1673353"/>
+          </a:xfrm>
+          <a:prstGeom prst="rect">
+            <a:avLst/>
+          </a:prstGeom>
+        </p:spPr>
+      </p:pic>
+      <p:pic>
+        <p:nvPicPr>
+          <p:cNvPr id="22" name="Picture 21"/>
+          <p:cNvPicPr>
+            <a:picLocks noChangeAspect="1"/>
+          </p:cNvPicPr>
+          <p:nvPr/>
+        </p:nvPicPr>
+        <p:blipFill>
+          <a:blip r:embed="rId11"/>
+          <a:stretch>
+            <a:fillRect/>
+          </a:stretch>
+        </p:blipFill>
+        <p:spPr>
+          <a:xfrm>
+            <a:off x="5811832" y="1785586"/>
+            <a:ext cx="2190321" cy="1671044"/>
+          </a:xfrm>
+          <a:prstGeom prst="rect">
+            <a:avLst/>
+          </a:prstGeom>
+        </p:spPr>
+      </p:pic>
+      <p:pic>
+        <p:nvPicPr>
+          <p:cNvPr id="23" name="Picture 22"/>
+          <p:cNvPicPr>
+            <a:picLocks noChangeAspect="1"/>
+          </p:cNvPicPr>
+          <p:nvPr/>
+        </p:nvPicPr>
+        <p:blipFill>
+          <a:blip r:embed="rId12"/>
+          <a:stretch>
+            <a:fillRect/>
+          </a:stretch>
+        </p:blipFill>
+        <p:spPr>
+          <a:xfrm>
+            <a:off x="7838741" y="1785585"/>
+            <a:ext cx="2223275" cy="1671045"/>
+          </a:xfrm>
+          <a:prstGeom prst="rect">
+            <a:avLst/>
+          </a:prstGeom>
+        </p:spPr>
+      </p:pic>
+      <p:pic>
+        <p:nvPicPr>
+          <p:cNvPr id="24" name="Picture 23"/>
+          <p:cNvPicPr>
+            <a:picLocks noChangeAspect="1"/>
+          </p:cNvPicPr>
+          <p:nvPr/>
+        </p:nvPicPr>
+        <p:blipFill>
+          <a:blip r:embed="rId13"/>
+          <a:stretch>
+            <a:fillRect/>
+          </a:stretch>
+        </p:blipFill>
+        <p:spPr>
+          <a:xfrm>
+            <a:off x="9891378" y="1785585"/>
+            <a:ext cx="2300622" cy="1671045"/>
+          </a:xfrm>
+          <a:prstGeom prst="rect">
+            <a:avLst/>
+          </a:prstGeom>
+        </p:spPr>
+      </p:pic>
+      <p:pic>
+        <p:nvPicPr>
+          <p:cNvPr id="25" name="Picture 24"/>
+          <p:cNvPicPr>
+            <a:picLocks noChangeAspect="1"/>
+          </p:cNvPicPr>
+          <p:nvPr/>
+        </p:nvPicPr>
+        <p:blipFill>
+          <a:blip r:embed="rId14"/>
+          <a:stretch>
+            <a:fillRect/>
+          </a:stretch>
+        </p:blipFill>
+        <p:spPr>
+          <a:xfrm>
+            <a:off x="1" y="3569631"/>
+            <a:ext cx="1892808" cy="1672649"/>
+          </a:xfrm>
+          <a:prstGeom prst="rect">
+            <a:avLst/>
+          </a:prstGeom>
+        </p:spPr>
+      </p:pic>
+      <p:pic>
+        <p:nvPicPr>
+          <p:cNvPr id="26" name="Picture 25"/>
+          <p:cNvPicPr>
+            <a:picLocks noChangeAspect="1"/>
+          </p:cNvPicPr>
+          <p:nvPr/>
+        </p:nvPicPr>
+        <p:blipFill>
+          <a:blip r:embed="rId15"/>
+          <a:stretch>
+            <a:fillRect/>
+          </a:stretch>
+        </p:blipFill>
+        <p:spPr>
+          <a:xfrm>
+            <a:off x="1742722" y="3567327"/>
+            <a:ext cx="2185416" cy="1674954"/>
+          </a:xfrm>
+          <a:prstGeom prst="rect">
+            <a:avLst/>
+          </a:prstGeom>
+        </p:spPr>
+      </p:pic>
+      <p:pic>
+        <p:nvPicPr>
+          <p:cNvPr id="27" name="Picture 26"/>
+          <p:cNvPicPr>
+            <a:picLocks noChangeAspect="1"/>
+          </p:cNvPicPr>
+          <p:nvPr/>
+        </p:nvPicPr>
+        <p:blipFill>
+          <a:blip r:embed="rId16"/>
+          <a:stretch>
+            <a:fillRect/>
+          </a:stretch>
+        </p:blipFill>
+        <p:spPr>
+          <a:xfrm>
+            <a:off x="3790898" y="3567326"/>
+            <a:ext cx="2180199" cy="1674954"/>
+          </a:xfrm>
+          <a:prstGeom prst="rect">
+            <a:avLst/>
+          </a:prstGeom>
+        </p:spPr>
+      </p:pic>
+      <p:pic>
+        <p:nvPicPr>
+          <p:cNvPr id="28" name="Picture 27"/>
+          <p:cNvPicPr>
+            <a:picLocks noChangeAspect="1"/>
+          </p:cNvPicPr>
+          <p:nvPr/>
+        </p:nvPicPr>
+        <p:blipFill>
+          <a:blip r:embed="rId17"/>
+          <a:stretch>
+            <a:fillRect/>
+          </a:stretch>
+        </p:blipFill>
+        <p:spPr>
+          <a:xfrm>
+            <a:off x="5822623" y="3567327"/>
+            <a:ext cx="2190321" cy="1671044"/>
+          </a:xfrm>
+          <a:prstGeom prst="rect">
+            <a:avLst/>
+          </a:prstGeom>
+        </p:spPr>
+      </p:pic>
+      <p:pic>
+        <p:nvPicPr>
+          <p:cNvPr id="29" name="Picture 28"/>
+          <p:cNvPicPr>
+            <a:picLocks noChangeAspect="1"/>
+          </p:cNvPicPr>
+          <p:nvPr/>
+        </p:nvPicPr>
+        <p:blipFill>
+          <a:blip r:embed="rId18"/>
+          <a:stretch>
+            <a:fillRect/>
+          </a:stretch>
+        </p:blipFill>
+        <p:spPr>
+          <a:xfrm>
+            <a:off x="7872312" y="3570169"/>
+            <a:ext cx="2200495" cy="1668202"/>
+          </a:xfrm>
+          <a:prstGeom prst="rect">
+            <a:avLst/>
+          </a:prstGeom>
+        </p:spPr>
+      </p:pic>
+      <p:pic>
+        <p:nvPicPr>
+          <p:cNvPr id="30" name="Picture 29"/>
+          <p:cNvPicPr>
+            <a:picLocks noChangeAspect="1"/>
+          </p:cNvPicPr>
+          <p:nvPr/>
+        </p:nvPicPr>
+        <p:blipFill>
+          <a:blip r:embed="rId19"/>
+          <a:stretch>
+            <a:fillRect/>
+          </a:stretch>
+        </p:blipFill>
+        <p:spPr>
+          <a:xfrm>
+            <a:off x="5960306" y="5238371"/>
+            <a:ext cx="3399780" cy="1663935"/>
+          </a:xfrm>
+          <a:prstGeom prst="rect">
+            <a:avLst/>
+          </a:prstGeom>
+        </p:spPr>
+      </p:pic>
+      <p:pic>
+        <p:nvPicPr>
+          <p:cNvPr id="31" name="Picture 30"/>
+          <p:cNvPicPr>
+            <a:picLocks noChangeAspect="1"/>
+          </p:cNvPicPr>
+          <p:nvPr/>
+        </p:nvPicPr>
+        <p:blipFill>
+          <a:blip r:embed="rId20"/>
+          <a:stretch>
+            <a:fillRect/>
+          </a:stretch>
+        </p:blipFill>
+        <p:spPr>
+          <a:xfrm>
+            <a:off x="10072806" y="3567326"/>
+            <a:ext cx="2129984" cy="1671045"/>
+          </a:xfrm>
+          <a:prstGeom prst="rect">
+            <a:avLst/>
+          </a:prstGeom>
+        </p:spPr>
+      </p:pic>
+      <p:pic>
+        <p:nvPicPr>
+          <p:cNvPr id="32" name="Picture 31"/>
+          <p:cNvPicPr>
+            <a:picLocks noChangeAspect="1"/>
+          </p:cNvPicPr>
+          <p:nvPr/>
+        </p:nvPicPr>
+        <p:blipFill>
+          <a:blip r:embed="rId21"/>
+          <a:stretch>
+            <a:fillRect/>
+          </a:stretch>
+        </p:blipFill>
+        <p:spPr>
+          <a:xfrm>
+            <a:off x="9055202" y="5238370"/>
+            <a:ext cx="3147588" cy="1663935"/>
           </a:xfrm>
           <a:prstGeom prst="rect">
             <a:avLst/>
@@ -5488,255 +6110,6 @@
     <p:extLst>
       <p:ext uri="{BB962C8B-B14F-4D97-AF65-F5344CB8AC3E}">
         <p14:creationId xmlns:p14="http://schemas.microsoft.com/office/powerpoint/2010/main" val="2888490902"/>
-      </p:ext>
-    </p:extLst>
-  </p:cSld>
-  <p:clrMapOvr>
-    <a:masterClrMapping/>
-  </p:clrMapOvr>
-</p:sld>
-</file>
-
-<file path=ppt/slides/slide3.xml><?xml version="1.0" encoding="utf-8"?>
-<p:sld xmlns:a="http://schemas.openxmlformats.org/drawingml/2006/main" xmlns:r="http://schemas.openxmlformats.org/officeDocument/2006/relationships" xmlns:p="http://schemas.openxmlformats.org/presentationml/2006/main">
-  <p:cSld>
-    <p:spTree>
-      <p:nvGrpSpPr>
-        <p:cNvPr id="1" name=""/>
-        <p:cNvGrpSpPr/>
-        <p:nvPr/>
-      </p:nvGrpSpPr>
-      <p:grpSpPr>
-        <a:xfrm>
-          <a:off x="0" y="0"/>
-          <a:ext cx="0" cy="0"/>
-          <a:chOff x="0" y="0"/>
-          <a:chExt cx="0" cy="0"/>
-        </a:xfrm>
-      </p:grpSpPr>
-      <p:sp>
-        <p:nvSpPr>
-          <p:cNvPr id="2" name="Title 1"/>
-          <p:cNvSpPr>
-            <a:spLocks noGrp="1"/>
-          </p:cNvSpPr>
-          <p:nvPr>
-            <p:ph type="title"/>
-          </p:nvPr>
-        </p:nvSpPr>
-        <p:spPr>
-          <a:xfrm>
-            <a:off x="684212" y="4487332"/>
-            <a:ext cx="8534400" cy="1871135"/>
-          </a:xfrm>
-        </p:spPr>
-        <p:txBody>
-          <a:bodyPr>
-            <a:noAutofit/>
-          </a:bodyPr>
-          <a:lstStyle/>
-          <a:p>
-            <a:r>
-              <a:rPr lang="en-US" sz="2000" dirty="0"/>
-              <a:t>Correlation between How I Met Your Mother viewership and </a:t>
-            </a:r>
-            <a:br>
-              <a:rPr lang="en-US" sz="2000" dirty="0"/>
-            </a:br>
-            <a:r>
-              <a:rPr lang="en-US" sz="2000" dirty="0"/>
-              <a:t>children named Barney : -0.490</a:t>
-            </a:r>
-            <a:br>
-              <a:rPr lang="en-US" sz="2000" dirty="0"/>
-            </a:br>
-            <a:r>
-              <a:rPr lang="en-US" sz="2000" dirty="0"/>
-              <a:t>children named Robin : -0.575</a:t>
-            </a:r>
-            <a:br>
-              <a:rPr lang="en-US" sz="2000" dirty="0"/>
-            </a:br>
-            <a:r>
-              <a:rPr lang="en-US" sz="2000" dirty="0"/>
-              <a:t>children named Ted : -0.662</a:t>
-            </a:r>
-            <a:br>
-              <a:rPr lang="en-US" sz="2000" dirty="0"/>
-            </a:br>
-            <a:r>
-              <a:rPr lang="en-US" sz="2000" dirty="0"/>
-              <a:t>children named Lily : 0.875</a:t>
-            </a:r>
-            <a:br>
-              <a:rPr lang="en-US" sz="2000" dirty="0"/>
-            </a:br>
-            <a:r>
-              <a:rPr lang="en-US" sz="2000" dirty="0"/>
-              <a:t>children named Marshall : 0.215</a:t>
-            </a:r>
-            <a:endParaRPr lang="en-US" sz="2000" dirty="0"/>
-          </a:p>
-        </p:txBody>
-      </p:sp>
-      <p:pic>
-        <p:nvPicPr>
-          <p:cNvPr id="4" name="Content Placeholder 3"/>
-          <p:cNvPicPr>
-            <a:picLocks noGrp="1" noChangeAspect="1"/>
-          </p:cNvPicPr>
-          <p:nvPr>
-            <p:ph idx="1"/>
-          </p:nvPr>
-        </p:nvPicPr>
-        <p:blipFill>
-          <a:blip r:embed="rId2"/>
-          <a:stretch>
-            <a:fillRect/>
-          </a:stretch>
-        </p:blipFill>
-        <p:spPr>
-          <a:xfrm>
-            <a:off x="2794001" y="90156"/>
-            <a:ext cx="6811818" cy="4121626"/>
-          </a:xfrm>
-          <a:prstGeom prst="rect">
-            <a:avLst/>
-          </a:prstGeom>
-        </p:spPr>
-      </p:pic>
-    </p:spTree>
-    <p:extLst>
-      <p:ext uri="{BB962C8B-B14F-4D97-AF65-F5344CB8AC3E}">
-        <p14:creationId xmlns:p14="http://schemas.microsoft.com/office/powerpoint/2010/main" val="3841116704"/>
-      </p:ext>
-    </p:extLst>
-  </p:cSld>
-  <p:clrMapOvr>
-    <a:masterClrMapping/>
-  </p:clrMapOvr>
-</p:sld>
-</file>
-
-<file path=ppt/slides/slide4.xml><?xml version="1.0" encoding="utf-8"?>
-<p:sld xmlns:a="http://schemas.openxmlformats.org/drawingml/2006/main" xmlns:r="http://schemas.openxmlformats.org/officeDocument/2006/relationships" xmlns:p="http://schemas.openxmlformats.org/presentationml/2006/main">
-  <p:cSld>
-    <p:spTree>
-      <p:nvGrpSpPr>
-        <p:cNvPr id="1" name=""/>
-        <p:cNvGrpSpPr/>
-        <p:nvPr/>
-      </p:nvGrpSpPr>
-      <p:grpSpPr>
-        <a:xfrm>
-          <a:off x="0" y="0"/>
-          <a:ext cx="0" cy="0"/>
-          <a:chOff x="0" y="0"/>
-          <a:chExt cx="0" cy="0"/>
-        </a:xfrm>
-      </p:grpSpPr>
-      <p:sp>
-        <p:nvSpPr>
-          <p:cNvPr id="2" name="Title 1"/>
-          <p:cNvSpPr>
-            <a:spLocks noGrp="1"/>
-          </p:cNvSpPr>
-          <p:nvPr>
-            <p:ph type="title"/>
-          </p:nvPr>
-        </p:nvSpPr>
-        <p:spPr>
-          <a:xfrm>
-            <a:off x="684212" y="4487332"/>
-            <a:ext cx="8534400" cy="2269068"/>
-          </a:xfrm>
-        </p:spPr>
-        <p:txBody>
-          <a:bodyPr>
-            <a:noAutofit/>
-          </a:bodyPr>
-          <a:lstStyle/>
-          <a:p>
-            <a:r>
-              <a:rPr lang="en-US" sz="2000" dirty="0"/>
-              <a:t>Correlation between Game of Thrones viewership and </a:t>
-            </a:r>
-            <a:br>
-              <a:rPr lang="en-US" sz="2000" dirty="0"/>
-            </a:br>
-            <a:r>
-              <a:rPr lang="en-US" sz="2000" dirty="0"/>
-              <a:t>children named Daenerys : 0.954</a:t>
-            </a:r>
-            <a:br>
-              <a:rPr lang="en-US" sz="2000" dirty="0"/>
-            </a:br>
-            <a:r>
-              <a:rPr lang="en-US" sz="2000" dirty="0"/>
-              <a:t>children named Khaleesi : 0.979</a:t>
-            </a:r>
-            <a:br>
-              <a:rPr lang="en-US" sz="2000" dirty="0"/>
-            </a:br>
-            <a:r>
-              <a:rPr lang="en-US" sz="2000" dirty="0"/>
-              <a:t>children named Jon : -0.727</a:t>
-            </a:r>
-            <a:br>
-              <a:rPr lang="en-US" sz="2000" dirty="0"/>
-            </a:br>
-            <a:r>
-              <a:rPr lang="en-US" sz="2000" dirty="0"/>
-              <a:t>children named Arya : 0.794</a:t>
-            </a:r>
-            <a:br>
-              <a:rPr lang="en-US" sz="2000" dirty="0"/>
-            </a:br>
-            <a:r>
-              <a:rPr lang="en-US" sz="2000" dirty="0"/>
-              <a:t>children named Sansa : 0.889</a:t>
-            </a:r>
-            <a:br>
-              <a:rPr lang="en-US" sz="2000" dirty="0"/>
-            </a:br>
-            <a:r>
-              <a:rPr lang="en-US" sz="2000" dirty="0"/>
-              <a:t>children named Tyrion : 0.857</a:t>
-            </a:r>
-            <a:endParaRPr lang="en-US" sz="2000" dirty="0"/>
-          </a:p>
-        </p:txBody>
-      </p:sp>
-      <p:pic>
-        <p:nvPicPr>
-          <p:cNvPr id="4" name="Content Placeholder 3"/>
-          <p:cNvPicPr>
-            <a:picLocks noGrp="1" noChangeAspect="1"/>
-          </p:cNvPicPr>
-          <p:nvPr>
-            <p:ph idx="1"/>
-          </p:nvPr>
-        </p:nvPicPr>
-        <p:blipFill>
-          <a:blip r:embed="rId2"/>
-          <a:stretch>
-            <a:fillRect/>
-          </a:stretch>
-        </p:blipFill>
-        <p:spPr>
-          <a:xfrm>
-            <a:off x="3158837" y="90157"/>
-            <a:ext cx="6419272" cy="4204752"/>
-          </a:xfrm>
-          <a:prstGeom prst="rect">
-            <a:avLst/>
-          </a:prstGeom>
-        </p:spPr>
-      </p:pic>
-    </p:spTree>
-    <p:extLst>
-      <p:ext uri="{BB962C8B-B14F-4D97-AF65-F5344CB8AC3E}">
-        <p14:creationId xmlns:p14="http://schemas.microsoft.com/office/powerpoint/2010/main" val="2856974784"/>
       </p:ext>
     </p:extLst>
   </p:cSld>

</xml_diff>

<commit_message>
Presentation updated and .pdf slide added.
</commit_message>
<xml_diff>
--- a/Project Presentation-The Aftermath.pptx
+++ b/Project Presentation-The Aftermath.pptx
@@ -5360,7 +5360,7 @@
         </p:nvSpPr>
         <p:spPr>
           <a:xfrm>
-            <a:off x="5639670" y="1076632"/>
+            <a:off x="1563927" y="954403"/>
             <a:ext cx="6400800" cy="624894"/>
           </a:xfrm>
         </p:spPr>
@@ -5529,6 +5529,45 @@
                 </a:solidFill>
               </a:rPr>
               <a:t>- It may also show greater or lesser appreciation of certain qualities, actions or agendas shown or persuaded by the characters </a:t>
+            </a:r>
+          </a:p>
+        </p:txBody>
+      </p:sp>
+      <p:sp>
+        <p:nvSpPr>
+          <p:cNvPr id="7" name="Rectangle 6"/>
+          <p:cNvSpPr/>
+          <p:nvPr/>
+        </p:nvSpPr>
+        <p:spPr>
+          <a:xfrm>
+            <a:off x="7476796" y="1075106"/>
+            <a:ext cx="2108269" cy="369332"/>
+          </a:xfrm>
+          <a:prstGeom prst="rect">
+            <a:avLst/>
+          </a:prstGeom>
+        </p:spPr>
+        <p:txBody>
+          <a:bodyPr wrap="none">
+            <a:spAutoFit/>
+          </a:bodyPr>
+          <a:lstStyle/>
+          <a:p>
+            <a:r>
+              <a:rPr lang="en-US" dirty="0"/>
+              <a:t>By </a:t>
+            </a:r>
+            <a:r>
+              <a:rPr lang="en-US" dirty="0">
+                <a:solidFill>
+                  <a:schemeClr val="bg1">
+                    <a:lumMod val="85000"/>
+                    <a:lumOff val="15000"/>
+                  </a:schemeClr>
+                </a:solidFill>
+              </a:rPr>
+              <a:t>Ahmed Ashraf</a:t>
             </a:r>
           </a:p>
         </p:txBody>
@@ -6106,6 +6145,41 @@
           </a:prstGeom>
         </p:spPr>
       </p:pic>
+      <p:sp>
+        <p:nvSpPr>
+          <p:cNvPr id="3" name="Rectangle 2"/>
+          <p:cNvSpPr/>
+          <p:nvPr/>
+        </p:nvSpPr>
+        <p:spPr>
+          <a:xfrm>
+            <a:off x="1" y="5350669"/>
+            <a:ext cx="5783342" cy="1200329"/>
+          </a:xfrm>
+          <a:prstGeom prst="rect">
+            <a:avLst/>
+          </a:prstGeom>
+        </p:spPr>
+        <p:txBody>
+          <a:bodyPr wrap="square">
+            <a:spAutoFit/>
+          </a:bodyPr>
+          <a:lstStyle/>
+          <a:p>
+            <a:r>
+              <a:rPr lang="en-US" dirty="0">
+                <a:solidFill>
+                  <a:schemeClr val="accent6">
+                    <a:lumMod val="40000"/>
+                    <a:lumOff val="60000"/>
+                  </a:schemeClr>
+                </a:solidFill>
+              </a:rPr>
+              <a:t>The popularity of a TV Show DOES impact the number of newborn named similarly to the characters from the show. It is especially noticeable with uncommon and fantasy names</a:t>
+            </a:r>
+          </a:p>
+        </p:txBody>
+      </p:sp>
     </p:spTree>
     <p:extLst>
       <p:ext uri="{BB962C8B-B14F-4D97-AF65-F5344CB8AC3E}">

</xml_diff>